<commit_message>
add pages to ppt
</commit_message>
<xml_diff>
--- a/langchain/rag_playground.pptx
+++ b/langchain/rag_playground.pptx
@@ -5,7 +5,7 @@
     <p:sldMasterId id="2147483648" r:id="rId1"/>
   </p:sldMasterIdLst>
   <p:notesMasterIdLst>
-    <p:notesMasterId r:id="rId19"/>
+    <p:notesMasterId r:id="rId20"/>
   </p:notesMasterIdLst>
   <p:sldIdLst>
     <p:sldId id="256" r:id="rId2"/>
@@ -23,8 +23,9 @@
     <p:sldId id="274" r:id="rId14"/>
     <p:sldId id="276" r:id="rId15"/>
     <p:sldId id="277" r:id="rId16"/>
-    <p:sldId id="278" r:id="rId17"/>
-    <p:sldId id="275" r:id="rId18"/>
+    <p:sldId id="275" r:id="rId17"/>
+    <p:sldId id="278" r:id="rId18"/>
+    <p:sldId id="279" r:id="rId19"/>
   </p:sldIdLst>
   <p:sldSz cx="12192000" cy="6858000"/>
   <p:notesSz cx="6858000" cy="9144000"/>
@@ -5199,6 +5200,810 @@
         <p:spPr>
           <a:xfrm>
             <a:off x="77274" y="45076"/>
+            <a:ext cx="4095993" cy="369332"/>
+          </a:xfrm>
+          <a:prstGeom prst="rect">
+            <a:avLst/>
+          </a:prstGeom>
+          <a:noFill/>
+        </p:spPr>
+        <p:txBody>
+          <a:bodyPr wrap="none" rtlCol="0">
+            <a:spAutoFit/>
+          </a:bodyPr>
+          <a:lstStyle/>
+          <a:p>
+            <a:r>
+              <a:rPr kumimoji="1" lang="en-US" altLang="ko-KR" dirty="0" err="1">
+                <a:latin typeface="Arial Unicode MS" panose="020B0604020202020204" pitchFamily="34" charset="-128"/>
+                <a:ea typeface="Arial Unicode MS" panose="020B0604020202020204" pitchFamily="34" charset="-128"/>
+              </a:rPr>
+              <a:t>LangGraph</a:t>
+            </a:r>
+            <a:r>
+              <a:rPr kumimoji="1" lang="en-US" altLang="ko-KR" dirty="0">
+                <a:latin typeface="Arial Unicode MS" panose="020B0604020202020204" pitchFamily="34" charset="-128"/>
+                <a:ea typeface="Arial Unicode MS" panose="020B0604020202020204" pitchFamily="34" charset="-128"/>
+              </a:rPr>
+              <a:t> – Real World Applications</a:t>
+            </a:r>
+            <a:endParaRPr kumimoji="1" lang="ko-KR" altLang="en-US" dirty="0">
+              <a:latin typeface="Arial Unicode MS" panose="020B0604020202020204" pitchFamily="34" charset="-128"/>
+              <a:ea typeface="Arial Unicode MS" panose="020B0604020202020204" pitchFamily="34" charset="-128"/>
+            </a:endParaRPr>
+          </a:p>
+        </p:txBody>
+      </p:sp>
+      <p:sp>
+        <p:nvSpPr>
+          <p:cNvPr id="4" name="TextBox 3">
+            <a:extLst>
+              <a:ext uri="{FF2B5EF4-FFF2-40B4-BE49-F238E27FC236}">
+                <a16:creationId xmlns:a16="http://schemas.microsoft.com/office/drawing/2014/main" id="{48863633-3E48-E881-C086-1A02DE2E1F5E}"/>
+              </a:ext>
+            </a:extLst>
+          </p:cNvPr>
+          <p:cNvSpPr txBox="1"/>
+          <p:nvPr/>
+        </p:nvSpPr>
+        <p:spPr>
+          <a:xfrm>
+            <a:off x="143163" y="582067"/>
+            <a:ext cx="11776364" cy="5816977"/>
+          </a:xfrm>
+          <a:prstGeom prst="rect">
+            <a:avLst/>
+          </a:prstGeom>
+          <a:noFill/>
+        </p:spPr>
+        <p:txBody>
+          <a:bodyPr wrap="square">
+            <a:spAutoFit/>
+          </a:bodyPr>
+          <a:lstStyle/>
+          <a:p>
+            <a:pPr algn="l" rtl="0"/>
+            <a:r>
+              <a:rPr lang="en" altLang="ko-KR" sz="1600" b="1" i="0" dirty="0">
+                <a:solidFill>
+                  <a:srgbClr val="00B050"/>
+                </a:solidFill>
+                <a:effectLst/>
+                <a:highlight>
+                  <a:srgbClr val="FFFFFF"/>
+                </a:highlight>
+                <a:latin typeface="Arial Unicode MS" panose="020B0604020202020204" pitchFamily="34" charset="-128"/>
+                <a:ea typeface="Arial Unicode MS" panose="020B0604020202020204" pitchFamily="34" charset="-128"/>
+                <a:cs typeface="Arial Unicode MS" panose="020B0604020202020204" pitchFamily="34" charset="-128"/>
+              </a:rPr>
+              <a:t>Chatbots</a:t>
+            </a:r>
+          </a:p>
+          <a:p>
+            <a:pPr algn="l" rtl="0"/>
+            <a:r>
+              <a:rPr lang="en" altLang="ko-KR" sz="1200" b="0" i="0" u="none" strike="noStrike" dirty="0">
+                <a:solidFill>
+                  <a:srgbClr val="05192D"/>
+                </a:solidFill>
+                <a:effectLst/>
+                <a:highlight>
+                  <a:srgbClr val="FFFFFF"/>
+                </a:highlight>
+                <a:latin typeface="Arial Unicode MS" panose="020B0604020202020204" pitchFamily="34" charset="-128"/>
+                <a:ea typeface="Arial Unicode MS" panose="020B0604020202020204" pitchFamily="34" charset="-128"/>
+                <a:cs typeface="Arial Unicode MS" panose="020B0604020202020204" pitchFamily="34" charset="-128"/>
+              </a:rPr>
+              <a:t>By leveraging multiple LLM agents, these chatbots can process natural language queries, provide accurate responses, and seamlessly switch between different conversation topics. The ability to manage state and coordinate interactions ensures that the chatbot maintains context and delivers a coherent user experience.</a:t>
+            </a:r>
+            <a:endParaRPr lang="en" altLang="ko-KR" sz="1200" b="0" i="0" dirty="0">
+              <a:solidFill>
+                <a:srgbClr val="05192D"/>
+              </a:solidFill>
+              <a:effectLst/>
+              <a:highlight>
+                <a:srgbClr val="FFFFFF"/>
+              </a:highlight>
+              <a:latin typeface="Arial Unicode MS" panose="020B0604020202020204" pitchFamily="34" charset="-128"/>
+              <a:ea typeface="Arial Unicode MS" panose="020B0604020202020204" pitchFamily="34" charset="-128"/>
+              <a:cs typeface="Arial Unicode MS" panose="020B0604020202020204" pitchFamily="34" charset="-128"/>
+            </a:endParaRPr>
+          </a:p>
+          <a:p>
+            <a:pPr algn="l" rtl="0"/>
+            <a:endParaRPr lang="en" altLang="ko-KR" sz="1200" b="1" i="0" dirty="0">
+              <a:solidFill>
+                <a:srgbClr val="05192D"/>
+              </a:solidFill>
+              <a:effectLst/>
+              <a:highlight>
+                <a:srgbClr val="FFFFFF"/>
+              </a:highlight>
+              <a:latin typeface="Arial Unicode MS" panose="020B0604020202020204" pitchFamily="34" charset="-128"/>
+              <a:ea typeface="Arial Unicode MS" panose="020B0604020202020204" pitchFamily="34" charset="-128"/>
+              <a:cs typeface="Arial Unicode MS" panose="020B0604020202020204" pitchFamily="34" charset="-128"/>
+            </a:endParaRPr>
+          </a:p>
+          <a:p>
+            <a:pPr algn="l" rtl="0"/>
+            <a:r>
+              <a:rPr lang="en" altLang="ko-KR" sz="1600" b="1" i="0" dirty="0">
+                <a:solidFill>
+                  <a:srgbClr val="00B050"/>
+                </a:solidFill>
+                <a:effectLst/>
+                <a:highlight>
+                  <a:srgbClr val="FFFFFF"/>
+                </a:highlight>
+                <a:latin typeface="Arial Unicode MS" panose="020B0604020202020204" pitchFamily="34" charset="-128"/>
+                <a:ea typeface="Arial Unicode MS" panose="020B0604020202020204" pitchFamily="34" charset="-128"/>
+                <a:cs typeface="Arial Unicode MS" panose="020B0604020202020204" pitchFamily="34" charset="-128"/>
+              </a:rPr>
+              <a:t>Autonomous agents</a:t>
+            </a:r>
+          </a:p>
+          <a:p>
+            <a:pPr algn="l" rtl="0"/>
+            <a:r>
+              <a:rPr lang="en" altLang="ko-KR" sz="1200" b="0" i="0" u="none" strike="noStrike" dirty="0">
+                <a:solidFill>
+                  <a:srgbClr val="05192D"/>
+                </a:solidFill>
+                <a:effectLst/>
+                <a:highlight>
+                  <a:srgbClr val="FFFFFF"/>
+                </a:highlight>
+                <a:latin typeface="Arial Unicode MS" panose="020B0604020202020204" pitchFamily="34" charset="-128"/>
+                <a:ea typeface="Arial Unicode MS" panose="020B0604020202020204" pitchFamily="34" charset="-128"/>
+                <a:cs typeface="Arial Unicode MS" panose="020B0604020202020204" pitchFamily="34" charset="-128"/>
+              </a:rPr>
+              <a:t>For applications requiring autonomous decision-making, </a:t>
+            </a:r>
+            <a:r>
+              <a:rPr lang="en" altLang="ko-KR" sz="1200" b="0" i="0" u="none" strike="noStrike" dirty="0" err="1">
+                <a:solidFill>
+                  <a:srgbClr val="05192D"/>
+                </a:solidFill>
+                <a:effectLst/>
+                <a:highlight>
+                  <a:srgbClr val="FFFFFF"/>
+                </a:highlight>
+                <a:latin typeface="Arial Unicode MS" panose="020B0604020202020204" pitchFamily="34" charset="-128"/>
+                <a:ea typeface="Arial Unicode MS" panose="020B0604020202020204" pitchFamily="34" charset="-128"/>
+                <a:cs typeface="Arial Unicode MS" panose="020B0604020202020204" pitchFamily="34" charset="-128"/>
+              </a:rPr>
+              <a:t>LangGraph</a:t>
+            </a:r>
+            <a:r>
+              <a:rPr lang="en" altLang="ko-KR" sz="1200" b="0" i="0" u="none" strike="noStrike" dirty="0">
+                <a:solidFill>
+                  <a:srgbClr val="05192D"/>
+                </a:solidFill>
+                <a:effectLst/>
+                <a:highlight>
+                  <a:srgbClr val="FFFFFF"/>
+                </a:highlight>
+                <a:latin typeface="Arial Unicode MS" panose="020B0604020202020204" pitchFamily="34" charset="-128"/>
+                <a:ea typeface="Arial Unicode MS" panose="020B0604020202020204" pitchFamily="34" charset="-128"/>
+                <a:cs typeface="Arial Unicode MS" panose="020B0604020202020204" pitchFamily="34" charset="-128"/>
+              </a:rPr>
+              <a:t> enables the creation of agents that can perform tasks independently based on user inputs and predefined </a:t>
+            </a:r>
+            <a:r>
+              <a:rPr lang="en" altLang="ko-KR" sz="1200" b="0" i="0" u="none" strike="noStrike">
+                <a:solidFill>
+                  <a:srgbClr val="05192D"/>
+                </a:solidFill>
+                <a:effectLst/>
+                <a:highlight>
+                  <a:srgbClr val="FFFFFF"/>
+                </a:highlight>
+                <a:latin typeface="Arial Unicode MS" panose="020B0604020202020204" pitchFamily="34" charset="-128"/>
+                <a:ea typeface="Arial Unicode MS" panose="020B0604020202020204" pitchFamily="34" charset="-128"/>
+                <a:cs typeface="Arial Unicode MS" panose="020B0604020202020204" pitchFamily="34" charset="-128"/>
+              </a:rPr>
+              <a:t>logic. </a:t>
+            </a:r>
+          </a:p>
+          <a:p>
+            <a:pPr algn="l" rtl="0"/>
+            <a:r>
+              <a:rPr lang="en" altLang="ko-KR" sz="1200" b="0" i="0" u="none" strike="noStrike">
+                <a:solidFill>
+                  <a:srgbClr val="05192D"/>
+                </a:solidFill>
+                <a:effectLst/>
+                <a:highlight>
+                  <a:srgbClr val="FFFFFF"/>
+                </a:highlight>
+                <a:latin typeface="Arial Unicode MS" panose="020B0604020202020204" pitchFamily="34" charset="-128"/>
+                <a:ea typeface="Arial Unicode MS" panose="020B0604020202020204" pitchFamily="34" charset="-128"/>
+                <a:cs typeface="Arial Unicode MS" panose="020B0604020202020204" pitchFamily="34" charset="-128"/>
+              </a:rPr>
+              <a:t>These </a:t>
+            </a:r>
+            <a:r>
+              <a:rPr lang="en" altLang="ko-KR" sz="1200" b="0" i="0" u="none" strike="noStrike" dirty="0">
+                <a:solidFill>
+                  <a:srgbClr val="05192D"/>
+                </a:solidFill>
+                <a:effectLst/>
+                <a:highlight>
+                  <a:srgbClr val="FFFFFF"/>
+                </a:highlight>
+                <a:latin typeface="Arial Unicode MS" panose="020B0604020202020204" pitchFamily="34" charset="-128"/>
+                <a:ea typeface="Arial Unicode MS" panose="020B0604020202020204" pitchFamily="34" charset="-128"/>
+                <a:cs typeface="Arial Unicode MS" panose="020B0604020202020204" pitchFamily="34" charset="-128"/>
+              </a:rPr>
+              <a:t>agents can execute complex workflows, interact with other systems, and adapt to new information dynamically. </a:t>
+            </a:r>
+            <a:r>
+              <a:rPr lang="en" altLang="ko-KR" sz="1200" b="0" i="0" u="none" strike="noStrike" dirty="0" err="1">
+                <a:solidFill>
+                  <a:srgbClr val="05192D"/>
+                </a:solidFill>
+                <a:effectLst/>
+                <a:highlight>
+                  <a:srgbClr val="FFFFFF"/>
+                </a:highlight>
+                <a:latin typeface="Arial Unicode MS" panose="020B0604020202020204" pitchFamily="34" charset="-128"/>
+                <a:ea typeface="Arial Unicode MS" panose="020B0604020202020204" pitchFamily="34" charset="-128"/>
+                <a:cs typeface="Arial Unicode MS" panose="020B0604020202020204" pitchFamily="34" charset="-128"/>
+              </a:rPr>
+              <a:t>LangGraph's</a:t>
+            </a:r>
+            <a:r>
+              <a:rPr lang="en" altLang="ko-KR" sz="1200" b="0" i="0" u="none" strike="noStrike" dirty="0">
+                <a:solidFill>
+                  <a:srgbClr val="05192D"/>
+                </a:solidFill>
+                <a:effectLst/>
+                <a:highlight>
+                  <a:srgbClr val="FFFFFF"/>
+                </a:highlight>
+                <a:latin typeface="Arial Unicode MS" panose="020B0604020202020204" pitchFamily="34" charset="-128"/>
+                <a:ea typeface="Arial Unicode MS" panose="020B0604020202020204" pitchFamily="34" charset="-128"/>
+                <a:cs typeface="Arial Unicode MS" panose="020B0604020202020204" pitchFamily="34" charset="-128"/>
+              </a:rPr>
+              <a:t> structured framework ensures that each agent operates efficiently and effectively, making it suitable for tasks like automated customer support, data processing, and system monitoring.</a:t>
+            </a:r>
+            <a:endParaRPr lang="en" altLang="ko-KR" sz="1200" b="0" i="0" dirty="0">
+              <a:solidFill>
+                <a:srgbClr val="05192D"/>
+              </a:solidFill>
+              <a:effectLst/>
+              <a:highlight>
+                <a:srgbClr val="FFFFFF"/>
+              </a:highlight>
+              <a:latin typeface="Arial Unicode MS" panose="020B0604020202020204" pitchFamily="34" charset="-128"/>
+              <a:ea typeface="Arial Unicode MS" panose="020B0604020202020204" pitchFamily="34" charset="-128"/>
+              <a:cs typeface="Arial Unicode MS" panose="020B0604020202020204" pitchFamily="34" charset="-128"/>
+            </a:endParaRPr>
+          </a:p>
+          <a:p>
+            <a:pPr algn="l" rtl="0"/>
+            <a:endParaRPr lang="en" altLang="ko-KR" sz="1200" b="1" i="0" dirty="0">
+              <a:solidFill>
+                <a:srgbClr val="05192D"/>
+              </a:solidFill>
+              <a:effectLst/>
+              <a:highlight>
+                <a:srgbClr val="FFFFFF"/>
+              </a:highlight>
+              <a:latin typeface="Arial Unicode MS" panose="020B0604020202020204" pitchFamily="34" charset="-128"/>
+              <a:ea typeface="Arial Unicode MS" panose="020B0604020202020204" pitchFamily="34" charset="-128"/>
+              <a:cs typeface="Arial Unicode MS" panose="020B0604020202020204" pitchFamily="34" charset="-128"/>
+            </a:endParaRPr>
+          </a:p>
+          <a:p>
+            <a:pPr algn="l" rtl="0"/>
+            <a:r>
+              <a:rPr lang="en" altLang="ko-KR" sz="1600" b="1" i="0" dirty="0">
+                <a:solidFill>
+                  <a:srgbClr val="00B050"/>
+                </a:solidFill>
+                <a:effectLst/>
+                <a:highlight>
+                  <a:srgbClr val="FFFFFF"/>
+                </a:highlight>
+                <a:latin typeface="Arial Unicode MS" panose="020B0604020202020204" pitchFamily="34" charset="-128"/>
+                <a:ea typeface="Arial Unicode MS" panose="020B0604020202020204" pitchFamily="34" charset="-128"/>
+                <a:cs typeface="Arial Unicode MS" panose="020B0604020202020204" pitchFamily="34" charset="-128"/>
+              </a:rPr>
+              <a:t>Multi-Agent systems</a:t>
+            </a:r>
+          </a:p>
+          <a:p>
+            <a:pPr algn="l" rtl="0"/>
+            <a:r>
+              <a:rPr lang="en" altLang="ko-KR" sz="1200" b="0" i="0" u="none" strike="noStrike" dirty="0" err="1">
+                <a:solidFill>
+                  <a:srgbClr val="05192D"/>
+                </a:solidFill>
+                <a:effectLst/>
+                <a:highlight>
+                  <a:srgbClr val="FFFFFF"/>
+                </a:highlight>
+                <a:latin typeface="Arial Unicode MS" panose="020B0604020202020204" pitchFamily="34" charset="-128"/>
+                <a:ea typeface="Arial Unicode MS" panose="020B0604020202020204" pitchFamily="34" charset="-128"/>
+                <a:cs typeface="Arial Unicode MS" panose="020B0604020202020204" pitchFamily="34" charset="-128"/>
+              </a:rPr>
+              <a:t>LangGraph</a:t>
+            </a:r>
+            <a:r>
+              <a:rPr lang="en" altLang="ko-KR" sz="1200" b="0" i="0" u="none" strike="noStrike" dirty="0">
+                <a:solidFill>
+                  <a:srgbClr val="05192D"/>
+                </a:solidFill>
+                <a:effectLst/>
+                <a:highlight>
+                  <a:srgbClr val="FFFFFF"/>
+                </a:highlight>
+                <a:latin typeface="Arial Unicode MS" panose="020B0604020202020204" pitchFamily="34" charset="-128"/>
+                <a:ea typeface="Arial Unicode MS" panose="020B0604020202020204" pitchFamily="34" charset="-128"/>
+                <a:cs typeface="Arial Unicode MS" panose="020B0604020202020204" pitchFamily="34" charset="-128"/>
+              </a:rPr>
+              <a:t> excels in building applications where multiple agents collaborate to achieve a common goal. For example, different agents can manage inventory, process orders, and coordinate deliveries in a supply chain management system. </a:t>
+            </a:r>
+            <a:r>
+              <a:rPr lang="en" altLang="ko-KR" sz="1200" b="0" i="0" u="none" strike="noStrike" dirty="0" err="1">
+                <a:solidFill>
+                  <a:srgbClr val="05192D"/>
+                </a:solidFill>
+                <a:effectLst/>
+                <a:highlight>
+                  <a:srgbClr val="FFFFFF"/>
+                </a:highlight>
+                <a:latin typeface="Arial Unicode MS" panose="020B0604020202020204" pitchFamily="34" charset="-128"/>
+                <a:ea typeface="Arial Unicode MS" panose="020B0604020202020204" pitchFamily="34" charset="-128"/>
+                <a:cs typeface="Arial Unicode MS" panose="020B0604020202020204" pitchFamily="34" charset="-128"/>
+              </a:rPr>
+              <a:t>LangGraph's</a:t>
+            </a:r>
+            <a:r>
+              <a:rPr lang="en" altLang="ko-KR" sz="1200" b="0" i="0" u="none" strike="noStrike" dirty="0">
+                <a:solidFill>
+                  <a:srgbClr val="05192D"/>
+                </a:solidFill>
+                <a:effectLst/>
+                <a:highlight>
+                  <a:srgbClr val="FFFFFF"/>
+                </a:highlight>
+                <a:latin typeface="Arial Unicode MS" panose="020B0604020202020204" pitchFamily="34" charset="-128"/>
+                <a:ea typeface="Arial Unicode MS" panose="020B0604020202020204" pitchFamily="34" charset="-128"/>
+                <a:cs typeface="Arial Unicode MS" panose="020B0604020202020204" pitchFamily="34" charset="-128"/>
+              </a:rPr>
+              <a:t> coordination capabilities ensure that each agent communicates effectively, sharing information and making decisions in a synchronized manner. This leads to more efficient operations and better overall system performance.</a:t>
+            </a:r>
+            <a:endParaRPr lang="en" altLang="ko-KR" sz="1200" b="0" i="0" dirty="0">
+              <a:solidFill>
+                <a:srgbClr val="05192D"/>
+              </a:solidFill>
+              <a:effectLst/>
+              <a:highlight>
+                <a:srgbClr val="FFFFFF"/>
+              </a:highlight>
+              <a:latin typeface="Arial Unicode MS" panose="020B0604020202020204" pitchFamily="34" charset="-128"/>
+              <a:ea typeface="Arial Unicode MS" panose="020B0604020202020204" pitchFamily="34" charset="-128"/>
+              <a:cs typeface="Arial Unicode MS" panose="020B0604020202020204" pitchFamily="34" charset="-128"/>
+            </a:endParaRPr>
+          </a:p>
+          <a:p>
+            <a:pPr algn="l" rtl="0"/>
+            <a:endParaRPr lang="en" altLang="ko-KR" sz="1200" b="1" i="0" dirty="0">
+              <a:solidFill>
+                <a:srgbClr val="05192D"/>
+              </a:solidFill>
+              <a:effectLst/>
+              <a:highlight>
+                <a:srgbClr val="FFFFFF"/>
+              </a:highlight>
+              <a:latin typeface="Arial Unicode MS" panose="020B0604020202020204" pitchFamily="34" charset="-128"/>
+              <a:ea typeface="Arial Unicode MS" panose="020B0604020202020204" pitchFamily="34" charset="-128"/>
+              <a:cs typeface="Arial Unicode MS" panose="020B0604020202020204" pitchFamily="34" charset="-128"/>
+            </a:endParaRPr>
+          </a:p>
+          <a:p>
+            <a:pPr algn="l" rtl="0"/>
+            <a:r>
+              <a:rPr lang="en" altLang="ko-KR" sz="1600" b="1" i="0" dirty="0">
+                <a:solidFill>
+                  <a:srgbClr val="00B050"/>
+                </a:solidFill>
+                <a:effectLst/>
+                <a:highlight>
+                  <a:srgbClr val="FFFFFF"/>
+                </a:highlight>
+                <a:latin typeface="Arial Unicode MS" panose="020B0604020202020204" pitchFamily="34" charset="-128"/>
+                <a:ea typeface="Arial Unicode MS" panose="020B0604020202020204" pitchFamily="34" charset="-128"/>
+                <a:cs typeface="Arial Unicode MS" panose="020B0604020202020204" pitchFamily="34" charset="-128"/>
+              </a:rPr>
+              <a:t>Workflow automation tools</a:t>
+            </a:r>
+          </a:p>
+          <a:p>
+            <a:pPr algn="l" rtl="0"/>
+            <a:r>
+              <a:rPr lang="en" altLang="ko-KR" sz="1200" b="0" i="0" u="none" strike="noStrike" dirty="0">
+                <a:solidFill>
+                  <a:srgbClr val="05192D"/>
+                </a:solidFill>
+                <a:effectLst/>
+                <a:highlight>
+                  <a:srgbClr val="FFFFFF"/>
+                </a:highlight>
+                <a:latin typeface="Arial Unicode MS" panose="020B0604020202020204" pitchFamily="34" charset="-128"/>
+                <a:ea typeface="Arial Unicode MS" panose="020B0604020202020204" pitchFamily="34" charset="-128"/>
+                <a:cs typeface="Arial Unicode MS" panose="020B0604020202020204" pitchFamily="34" charset="-128"/>
+              </a:rPr>
+              <a:t>With </a:t>
+            </a:r>
+            <a:r>
+              <a:rPr lang="en" altLang="ko-KR" sz="1200" b="0" i="0" u="none" strike="noStrike" dirty="0" err="1">
+                <a:solidFill>
+                  <a:srgbClr val="05192D"/>
+                </a:solidFill>
+                <a:effectLst/>
+                <a:highlight>
+                  <a:srgbClr val="FFFFFF"/>
+                </a:highlight>
+                <a:latin typeface="Arial Unicode MS" panose="020B0604020202020204" pitchFamily="34" charset="-128"/>
+                <a:ea typeface="Arial Unicode MS" panose="020B0604020202020204" pitchFamily="34" charset="-128"/>
+                <a:cs typeface="Arial Unicode MS" panose="020B0604020202020204" pitchFamily="34" charset="-128"/>
+              </a:rPr>
+              <a:t>LangGraph</a:t>
+            </a:r>
+            <a:r>
+              <a:rPr lang="en" altLang="ko-KR" sz="1200" b="0" i="0" u="none" strike="noStrike" dirty="0">
+                <a:solidFill>
+                  <a:srgbClr val="05192D"/>
+                </a:solidFill>
+                <a:effectLst/>
+                <a:highlight>
+                  <a:srgbClr val="FFFFFF"/>
+                </a:highlight>
+                <a:latin typeface="Arial Unicode MS" panose="020B0604020202020204" pitchFamily="34" charset="-128"/>
+                <a:ea typeface="Arial Unicode MS" panose="020B0604020202020204" pitchFamily="34" charset="-128"/>
+                <a:cs typeface="Arial Unicode MS" panose="020B0604020202020204" pitchFamily="34" charset="-128"/>
+              </a:rPr>
+              <a:t>, automating business processes and workflows becomes straightforward. Intelligent agents can be designed to handle tasks such as document processing, approval workflows, and data analysis. By defining clear workflows and leveraging </a:t>
+            </a:r>
+            <a:r>
+              <a:rPr lang="en" altLang="ko-KR" sz="1200" b="0" i="0" u="none" strike="noStrike" dirty="0" err="1">
+                <a:solidFill>
+                  <a:srgbClr val="05192D"/>
+                </a:solidFill>
+                <a:effectLst/>
+                <a:highlight>
+                  <a:srgbClr val="FFFFFF"/>
+                </a:highlight>
+                <a:latin typeface="Arial Unicode MS" panose="020B0604020202020204" pitchFamily="34" charset="-128"/>
+                <a:ea typeface="Arial Unicode MS" panose="020B0604020202020204" pitchFamily="34" charset="-128"/>
+                <a:cs typeface="Arial Unicode MS" panose="020B0604020202020204" pitchFamily="34" charset="-128"/>
+              </a:rPr>
+              <a:t>LangGraph's</a:t>
+            </a:r>
+            <a:r>
+              <a:rPr lang="en" altLang="ko-KR" sz="1200" b="0" i="0" u="none" strike="noStrike" dirty="0">
+                <a:solidFill>
+                  <a:srgbClr val="05192D"/>
+                </a:solidFill>
+                <a:effectLst/>
+                <a:highlight>
+                  <a:srgbClr val="FFFFFF"/>
+                </a:highlight>
+                <a:latin typeface="Arial Unicode MS" panose="020B0604020202020204" pitchFamily="34" charset="-128"/>
+                <a:ea typeface="Arial Unicode MS" panose="020B0604020202020204" pitchFamily="34" charset="-128"/>
+                <a:cs typeface="Arial Unicode MS" panose="020B0604020202020204" pitchFamily="34" charset="-128"/>
+              </a:rPr>
+              <a:t> state management, these tools can execute complex sequences of actions without human intervention, reducing errors and increasing productivity.</a:t>
+            </a:r>
+            <a:endParaRPr lang="en" altLang="ko-KR" sz="1200" b="0" i="0" dirty="0">
+              <a:solidFill>
+                <a:srgbClr val="05192D"/>
+              </a:solidFill>
+              <a:effectLst/>
+              <a:highlight>
+                <a:srgbClr val="FFFFFF"/>
+              </a:highlight>
+              <a:latin typeface="Arial Unicode MS" panose="020B0604020202020204" pitchFamily="34" charset="-128"/>
+              <a:ea typeface="Arial Unicode MS" panose="020B0604020202020204" pitchFamily="34" charset="-128"/>
+              <a:cs typeface="Arial Unicode MS" panose="020B0604020202020204" pitchFamily="34" charset="-128"/>
+            </a:endParaRPr>
+          </a:p>
+          <a:p>
+            <a:pPr algn="l" rtl="0"/>
+            <a:endParaRPr lang="en" altLang="ko-KR" sz="1200" b="1" i="0" dirty="0">
+              <a:solidFill>
+                <a:srgbClr val="05192D"/>
+              </a:solidFill>
+              <a:effectLst/>
+              <a:highlight>
+                <a:srgbClr val="FFFFFF"/>
+              </a:highlight>
+              <a:latin typeface="Arial Unicode MS" panose="020B0604020202020204" pitchFamily="34" charset="-128"/>
+              <a:ea typeface="Arial Unicode MS" panose="020B0604020202020204" pitchFamily="34" charset="-128"/>
+              <a:cs typeface="Arial Unicode MS" panose="020B0604020202020204" pitchFamily="34" charset="-128"/>
+            </a:endParaRPr>
+          </a:p>
+          <a:p>
+            <a:pPr algn="l" rtl="0"/>
+            <a:r>
+              <a:rPr lang="en" altLang="ko-KR" sz="1600" b="1" i="0" dirty="0">
+                <a:solidFill>
+                  <a:srgbClr val="00B050"/>
+                </a:solidFill>
+                <a:effectLst/>
+                <a:highlight>
+                  <a:srgbClr val="FFFFFF"/>
+                </a:highlight>
+                <a:latin typeface="Arial Unicode MS" panose="020B0604020202020204" pitchFamily="34" charset="-128"/>
+                <a:ea typeface="Arial Unicode MS" panose="020B0604020202020204" pitchFamily="34" charset="-128"/>
+                <a:cs typeface="Arial Unicode MS" panose="020B0604020202020204" pitchFamily="34" charset="-128"/>
+              </a:rPr>
+              <a:t>Recommendation systems</a:t>
+            </a:r>
+          </a:p>
+          <a:p>
+            <a:pPr algn="l" rtl="0"/>
+            <a:r>
+              <a:rPr lang="en" altLang="ko-KR" sz="1200" b="0" i="0" u="none" strike="noStrike" dirty="0">
+                <a:solidFill>
+                  <a:srgbClr val="05192D"/>
+                </a:solidFill>
+                <a:effectLst/>
+                <a:highlight>
+                  <a:srgbClr val="FFFFFF"/>
+                </a:highlight>
+                <a:latin typeface="Arial Unicode MS" panose="020B0604020202020204" pitchFamily="34" charset="-128"/>
+                <a:ea typeface="Arial Unicode MS" panose="020B0604020202020204" pitchFamily="34" charset="-128"/>
+                <a:cs typeface="Arial Unicode MS" panose="020B0604020202020204" pitchFamily="34" charset="-128"/>
+              </a:rPr>
+              <a:t>Personalized recommendation systems can greatly benefit from </a:t>
+            </a:r>
+            <a:r>
+              <a:rPr lang="en" altLang="ko-KR" sz="1200" b="0" i="0" u="none" strike="noStrike" dirty="0" err="1">
+                <a:solidFill>
+                  <a:srgbClr val="05192D"/>
+                </a:solidFill>
+                <a:effectLst/>
+                <a:highlight>
+                  <a:srgbClr val="FFFFFF"/>
+                </a:highlight>
+                <a:latin typeface="Arial Unicode MS" panose="020B0604020202020204" pitchFamily="34" charset="-128"/>
+                <a:ea typeface="Arial Unicode MS" panose="020B0604020202020204" pitchFamily="34" charset="-128"/>
+                <a:cs typeface="Arial Unicode MS" panose="020B0604020202020204" pitchFamily="34" charset="-128"/>
+              </a:rPr>
+              <a:t>LangGraph's</a:t>
+            </a:r>
+            <a:r>
+              <a:rPr lang="en" altLang="ko-KR" sz="1200" b="0" i="0" u="none" strike="noStrike" dirty="0">
+                <a:solidFill>
+                  <a:srgbClr val="05192D"/>
+                </a:solidFill>
+                <a:effectLst/>
+                <a:highlight>
+                  <a:srgbClr val="FFFFFF"/>
+                </a:highlight>
+                <a:latin typeface="Arial Unicode MS" panose="020B0604020202020204" pitchFamily="34" charset="-128"/>
+                <a:ea typeface="Arial Unicode MS" panose="020B0604020202020204" pitchFamily="34" charset="-128"/>
+                <a:cs typeface="Arial Unicode MS" panose="020B0604020202020204" pitchFamily="34" charset="-128"/>
+              </a:rPr>
+              <a:t> capabilities. By employing multiple agents to analyze user behavior, preferences, and contextual data, these systems can deliver tailored suggestions for products, content, or services. </a:t>
+            </a:r>
+            <a:r>
+              <a:rPr lang="en" altLang="ko-KR" sz="1200" b="0" i="0" u="none" strike="noStrike" dirty="0" err="1">
+                <a:solidFill>
+                  <a:srgbClr val="05192D"/>
+                </a:solidFill>
+                <a:effectLst/>
+                <a:highlight>
+                  <a:srgbClr val="FFFFFF"/>
+                </a:highlight>
+                <a:latin typeface="Arial Unicode MS" panose="020B0604020202020204" pitchFamily="34" charset="-128"/>
+                <a:ea typeface="Arial Unicode MS" panose="020B0604020202020204" pitchFamily="34" charset="-128"/>
+                <a:cs typeface="Arial Unicode MS" panose="020B0604020202020204" pitchFamily="34" charset="-128"/>
+              </a:rPr>
+              <a:t>LangGraph's</a:t>
+            </a:r>
+            <a:r>
+              <a:rPr lang="en" altLang="ko-KR" sz="1200" b="0" i="0" u="none" strike="noStrike" dirty="0">
+                <a:solidFill>
+                  <a:srgbClr val="05192D"/>
+                </a:solidFill>
+                <a:effectLst/>
+                <a:highlight>
+                  <a:srgbClr val="FFFFFF"/>
+                </a:highlight>
+                <a:latin typeface="Arial Unicode MS" panose="020B0604020202020204" pitchFamily="34" charset="-128"/>
+                <a:ea typeface="Arial Unicode MS" panose="020B0604020202020204" pitchFamily="34" charset="-128"/>
+                <a:cs typeface="Arial Unicode MS" panose="020B0604020202020204" pitchFamily="34" charset="-128"/>
+              </a:rPr>
+              <a:t> flexibility allows for integrating various data sources and algorithms, enhancing the accuracy and relevance of recommendations.</a:t>
+            </a:r>
+            <a:endParaRPr lang="en" altLang="ko-KR" sz="1200" b="0" i="0" dirty="0">
+              <a:solidFill>
+                <a:srgbClr val="05192D"/>
+              </a:solidFill>
+              <a:effectLst/>
+              <a:highlight>
+                <a:srgbClr val="FFFFFF"/>
+              </a:highlight>
+              <a:latin typeface="Arial Unicode MS" panose="020B0604020202020204" pitchFamily="34" charset="-128"/>
+              <a:ea typeface="Arial Unicode MS" panose="020B0604020202020204" pitchFamily="34" charset="-128"/>
+              <a:cs typeface="Arial Unicode MS" panose="020B0604020202020204" pitchFamily="34" charset="-128"/>
+            </a:endParaRPr>
+          </a:p>
+          <a:p>
+            <a:pPr algn="l" rtl="0"/>
+            <a:endParaRPr lang="en" altLang="ko-KR" sz="1200" b="1" i="0" dirty="0">
+              <a:solidFill>
+                <a:srgbClr val="05192D"/>
+              </a:solidFill>
+              <a:effectLst/>
+              <a:highlight>
+                <a:srgbClr val="FFFFFF"/>
+              </a:highlight>
+              <a:latin typeface="Arial Unicode MS" panose="020B0604020202020204" pitchFamily="34" charset="-128"/>
+              <a:ea typeface="Arial Unicode MS" panose="020B0604020202020204" pitchFamily="34" charset="-128"/>
+              <a:cs typeface="Arial Unicode MS" panose="020B0604020202020204" pitchFamily="34" charset="-128"/>
+            </a:endParaRPr>
+          </a:p>
+          <a:p>
+            <a:pPr algn="l" rtl="0"/>
+            <a:r>
+              <a:rPr lang="en" altLang="ko-KR" sz="1600" b="1" i="0" dirty="0">
+                <a:solidFill>
+                  <a:srgbClr val="00B050"/>
+                </a:solidFill>
+                <a:effectLst/>
+                <a:highlight>
+                  <a:srgbClr val="FFFFFF"/>
+                </a:highlight>
+                <a:latin typeface="Arial Unicode MS" panose="020B0604020202020204" pitchFamily="34" charset="-128"/>
+                <a:ea typeface="Arial Unicode MS" panose="020B0604020202020204" pitchFamily="34" charset="-128"/>
+                <a:cs typeface="Arial Unicode MS" panose="020B0604020202020204" pitchFamily="34" charset="-128"/>
+              </a:rPr>
+              <a:t>Personalized learning environments</a:t>
+            </a:r>
+          </a:p>
+          <a:p>
+            <a:pPr algn="l" rtl="0"/>
+            <a:r>
+              <a:rPr lang="en" altLang="ko-KR" sz="1200" b="0" i="0" u="none" strike="noStrike" dirty="0">
+                <a:solidFill>
+                  <a:srgbClr val="05192D"/>
+                </a:solidFill>
+                <a:effectLst/>
+                <a:highlight>
+                  <a:srgbClr val="FFFFFF"/>
+                </a:highlight>
+                <a:latin typeface="Arial Unicode MS" panose="020B0604020202020204" pitchFamily="34" charset="-128"/>
+                <a:ea typeface="Arial Unicode MS" panose="020B0604020202020204" pitchFamily="34" charset="-128"/>
+                <a:cs typeface="Arial Unicode MS" panose="020B0604020202020204" pitchFamily="34" charset="-128"/>
+              </a:rPr>
+              <a:t>In educational platforms, </a:t>
+            </a:r>
+            <a:r>
+              <a:rPr lang="en" altLang="ko-KR" sz="1200" b="0" i="0" u="none" strike="noStrike" dirty="0" err="1">
+                <a:solidFill>
+                  <a:srgbClr val="05192D"/>
+                </a:solidFill>
+                <a:effectLst/>
+                <a:highlight>
+                  <a:srgbClr val="FFFFFF"/>
+                </a:highlight>
+                <a:latin typeface="Arial Unicode MS" panose="020B0604020202020204" pitchFamily="34" charset="-128"/>
+                <a:ea typeface="Arial Unicode MS" panose="020B0604020202020204" pitchFamily="34" charset="-128"/>
+                <a:cs typeface="Arial Unicode MS" panose="020B0604020202020204" pitchFamily="34" charset="-128"/>
+              </a:rPr>
+              <a:t>LangGraph</a:t>
+            </a:r>
+            <a:r>
+              <a:rPr lang="en" altLang="ko-KR" sz="1200" b="0" i="0" u="none" strike="noStrike" dirty="0">
+                <a:solidFill>
+                  <a:srgbClr val="05192D"/>
+                </a:solidFill>
+                <a:effectLst/>
+                <a:highlight>
+                  <a:srgbClr val="FFFFFF"/>
+                </a:highlight>
+                <a:latin typeface="Arial Unicode MS" panose="020B0604020202020204" pitchFamily="34" charset="-128"/>
+                <a:ea typeface="Arial Unicode MS" panose="020B0604020202020204" pitchFamily="34" charset="-128"/>
+                <a:cs typeface="Arial Unicode MS" panose="020B0604020202020204" pitchFamily="34" charset="-128"/>
+              </a:rPr>
+              <a:t> can be used to create adaptive learning environments that cater to individual learning styles and needs. Multiple agents can assess a student's progress, provide customized exercises, and offer real-time feedback. The stateful nature of </a:t>
+            </a:r>
+            <a:r>
+              <a:rPr lang="en" altLang="ko-KR" sz="1200" b="0" i="0" u="none" strike="noStrike" dirty="0" err="1">
+                <a:solidFill>
+                  <a:srgbClr val="05192D"/>
+                </a:solidFill>
+                <a:effectLst/>
+                <a:highlight>
+                  <a:srgbClr val="FFFFFF"/>
+                </a:highlight>
+                <a:latin typeface="Arial Unicode MS" panose="020B0604020202020204" pitchFamily="34" charset="-128"/>
+                <a:ea typeface="Arial Unicode MS" panose="020B0604020202020204" pitchFamily="34" charset="-128"/>
+                <a:cs typeface="Arial Unicode MS" panose="020B0604020202020204" pitchFamily="34" charset="-128"/>
+              </a:rPr>
+              <a:t>LangGraph</a:t>
+            </a:r>
+            <a:r>
+              <a:rPr lang="en" altLang="ko-KR" sz="1200" b="0" i="0" u="none" strike="noStrike" dirty="0">
+                <a:solidFill>
+                  <a:srgbClr val="05192D"/>
+                </a:solidFill>
+                <a:effectLst/>
+                <a:highlight>
+                  <a:srgbClr val="FFFFFF"/>
+                </a:highlight>
+                <a:latin typeface="Arial Unicode MS" panose="020B0604020202020204" pitchFamily="34" charset="-128"/>
+                <a:ea typeface="Arial Unicode MS" panose="020B0604020202020204" pitchFamily="34" charset="-128"/>
+                <a:cs typeface="Arial Unicode MS" panose="020B0604020202020204" pitchFamily="34" charset="-128"/>
+              </a:rPr>
+              <a:t> ensures that the system retains information about each learner's performance and preferences, enabling a more personalized and effective educational experience.</a:t>
+            </a:r>
+            <a:endParaRPr lang="en" altLang="ko-KR" sz="1200" b="0" i="0" dirty="0">
+              <a:solidFill>
+                <a:srgbClr val="05192D"/>
+              </a:solidFill>
+              <a:effectLst/>
+              <a:highlight>
+                <a:srgbClr val="FFFFFF"/>
+              </a:highlight>
+              <a:latin typeface="Arial Unicode MS" panose="020B0604020202020204" pitchFamily="34" charset="-128"/>
+              <a:ea typeface="Arial Unicode MS" panose="020B0604020202020204" pitchFamily="34" charset="-128"/>
+              <a:cs typeface="Arial Unicode MS" panose="020B0604020202020204" pitchFamily="34" charset="-128"/>
+            </a:endParaRPr>
+          </a:p>
+        </p:txBody>
+      </p:sp>
+    </p:spTree>
+    <p:extLst>
+      <p:ext uri="{BB962C8B-B14F-4D97-AF65-F5344CB8AC3E}">
+        <p14:creationId xmlns:p14="http://schemas.microsoft.com/office/powerpoint/2010/main" val="3333217876"/>
+      </p:ext>
+    </p:extLst>
+  </p:cSld>
+  <p:clrMapOvr>
+    <a:masterClrMapping/>
+  </p:clrMapOvr>
+</p:sld>
+</file>
+
+<file path=ppt/slides/slide17.xml><?xml version="1.0" encoding="utf-8"?>
+<p:sld xmlns:a="http://schemas.openxmlformats.org/drawingml/2006/main" xmlns:r="http://schemas.openxmlformats.org/officeDocument/2006/relationships" xmlns:p="http://schemas.openxmlformats.org/presentationml/2006/main">
+  <p:cSld>
+    <p:spTree>
+      <p:nvGrpSpPr>
+        <p:cNvPr id="1" name=""/>
+        <p:cNvGrpSpPr/>
+        <p:nvPr/>
+      </p:nvGrpSpPr>
+      <p:grpSpPr>
+        <a:xfrm>
+          <a:off x="0" y="0"/>
+          <a:ext cx="0" cy="0"/>
+          <a:chOff x="0" y="0"/>
+          <a:chExt cx="0" cy="0"/>
+        </a:xfrm>
+      </p:grpSpPr>
+      <p:sp>
+        <p:nvSpPr>
+          <p:cNvPr id="2" name="TextBox 1">
+            <a:extLst>
+              <a:ext uri="{FF2B5EF4-FFF2-40B4-BE49-F238E27FC236}">
+                <a16:creationId xmlns:a16="http://schemas.microsoft.com/office/drawing/2014/main" id="{9F22DA87-8F0D-2AD1-A03B-1581126C7FAF}"/>
+              </a:ext>
+            </a:extLst>
+          </p:cNvPr>
+          <p:cNvSpPr txBox="1"/>
+          <p:nvPr/>
+        </p:nvSpPr>
+        <p:spPr>
+          <a:xfrm>
+            <a:off x="77274" y="45076"/>
             <a:ext cx="966931" cy="369332"/>
           </a:xfrm>
           <a:prstGeom prst="rect">
@@ -5485,7 +6290,7 @@
 </p:sld>
 </file>
 
-<file path=ppt/slides/slide17.xml><?xml version="1.0" encoding="utf-8"?>
+<file path=ppt/slides/slide18.xml><?xml version="1.0" encoding="utf-8"?>
 <p:sld xmlns:a="http://schemas.openxmlformats.org/drawingml/2006/main" xmlns:r="http://schemas.openxmlformats.org/officeDocument/2006/relationships" xmlns:p="http://schemas.openxmlformats.org/presentationml/2006/main">
   <p:cSld>
     <p:spTree>
@@ -5547,7 +6352,7 @@
     </p:spTree>
     <p:extLst>
       <p:ext uri="{BB962C8B-B14F-4D97-AF65-F5344CB8AC3E}">
-        <p14:creationId xmlns:p14="http://schemas.microsoft.com/office/powerpoint/2010/main" val="3333217876"/>
+        <p14:creationId xmlns:p14="http://schemas.microsoft.com/office/powerpoint/2010/main" val="2424630563"/>
       </p:ext>
     </p:extLst>
   </p:cSld>

</xml_diff>